<commit_message>
Add writeup and presentation
</commit_message>
<xml_diff>
--- a/ML presentation.pptx
+++ b/ML presentation.pptx
@@ -815,7 +815,7 @@
   <p:cSld>
     <p:spTree>
       <p:nvGrpSpPr>
-        <p:cNvPr id="186" name="Shape 186"/>
+        <p:cNvPr id="189" name="Shape 189"/>
         <p:cNvGrpSpPr/>
         <p:nvPr/>
       </p:nvGrpSpPr>
@@ -829,7 +829,7 @@
       </p:grpSpPr>
       <p:sp>
         <p:nvSpPr>
-          <p:cNvPr id="187" name="Google Shape;187;ga59380a260_0_15:notes"/>
+          <p:cNvPr id="190" name="Google Shape;190;ga59380a260_0_15:notes"/>
           <p:cNvSpPr/>
           <p:nvPr>
             <p:ph idx="2" type="sldImg"/>
@@ -864,7 +864,7 @@
       </p:sp>
       <p:sp>
         <p:nvSpPr>
-          <p:cNvPr id="188" name="Google Shape;188;ga59380a260_0_15:notes"/>
+          <p:cNvPr id="191" name="Google Shape;191;ga59380a260_0_15:notes"/>
           <p:cNvSpPr txBox="1"/>
           <p:nvPr>
             <p:ph idx="1" type="body"/>
@@ -1676,6 +1676,22 @@
             <a:noAutofit/>
           </a:bodyPr>
           <a:lstStyle/>
+          <a:p>
+            <a:pPr indent="0" lvl="0" marL="0" rtl="0" algn="l">
+              <a:spcBef>
+                <a:spcPts val="0"/>
+              </a:spcBef>
+              <a:spcAft>
+                <a:spcPts val="0"/>
+              </a:spcAft>
+              <a:buNone/>
+            </a:pPr>
+            <a:r>
+              <a:rPr lang="en"/>
+              <a:t>activation = ReLU</a:t>
+            </a:r>
+            <a:endParaRPr/>
+          </a:p>
           <a:p>
             <a:pPr indent="0" lvl="0" marL="0" rtl="0" algn="l">
               <a:spcBef>
@@ -9886,7 +9902,7 @@
   <p:cSld>
     <p:spTree>
       <p:nvGrpSpPr>
-        <p:cNvPr id="189" name="Shape 189"/>
+        <p:cNvPr id="192" name="Shape 192"/>
         <p:cNvGrpSpPr/>
         <p:nvPr/>
       </p:nvGrpSpPr>
@@ -9900,7 +9916,7 @@
       </p:grpSpPr>
       <p:sp>
         <p:nvSpPr>
-          <p:cNvPr id="190" name="Google Shape;190;p22"/>
+          <p:cNvPr id="193" name="Google Shape;193;p22"/>
           <p:cNvSpPr txBox="1"/>
           <p:nvPr>
             <p:ph type="title"/>
@@ -9940,7 +9956,7 @@
       </p:sp>
       <p:sp>
         <p:nvSpPr>
-          <p:cNvPr id="191" name="Google Shape;191;p22"/>
+          <p:cNvPr id="194" name="Google Shape;194;p22"/>
           <p:cNvSpPr txBox="1"/>
           <p:nvPr>
             <p:ph idx="1" type="body"/>
@@ -11003,23 +11019,6 @@
             <a:r>
               <a:rPr lang="en" sz="1300"/>
               <a:t>Ridge, Lasso, Polynomial Feature transformation</a:t>
-            </a:r>
-            <a:endParaRPr sz="1300"/>
-          </a:p>
-          <a:p>
-            <a:pPr indent="-311150" lvl="1" marL="914400" rtl="0" algn="l">
-              <a:spcBef>
-                <a:spcPts val="0"/>
-              </a:spcBef>
-              <a:spcAft>
-                <a:spcPts val="0"/>
-              </a:spcAft>
-              <a:buSzPts val="1300"/>
-              <a:buChar char="○"/>
-            </a:pPr>
-            <a:r>
-              <a:rPr lang="en" sz="1300"/>
-              <a:t>Max accuracy of 0.4</a:t>
             </a:r>
             <a:endParaRPr sz="1300"/>
           </a:p>
@@ -11575,8 +11574,8 @@
         </p:blipFill>
         <p:spPr>
           <a:xfrm>
-            <a:off x="4995450" y="1941738"/>
-            <a:ext cx="3658100" cy="2545975"/>
+            <a:off x="5514850" y="442803"/>
+            <a:ext cx="2687051" cy="1875575"/>
           </a:xfrm>
           <a:prstGeom prst="rect">
             <a:avLst/>
@@ -11587,6 +11586,147 @@
           </a:ln>
         </p:spPr>
       </p:pic>
+      <p:pic>
+        <p:nvPicPr>
+          <p:cNvPr id="186" name="Google Shape;186;p21"/>
+          <p:cNvPicPr preferRelativeResize="0"/>
+          <p:nvPr/>
+        </p:nvPicPr>
+        <p:blipFill>
+          <a:blip r:embed="rId4">
+            <a:alphaModFix/>
+          </a:blip>
+          <a:stretch>
+            <a:fillRect/>
+          </a:stretch>
+        </p:blipFill>
+        <p:spPr>
+          <a:xfrm>
+            <a:off x="5796452" y="2695975"/>
+            <a:ext cx="2528401" cy="1742750"/>
+          </a:xfrm>
+          <a:prstGeom prst="rect">
+            <a:avLst/>
+          </a:prstGeom>
+          <a:noFill/>
+          <a:ln>
+            <a:noFill/>
+          </a:ln>
+        </p:spPr>
+      </p:pic>
+      <p:sp>
+        <p:nvSpPr>
+          <p:cNvPr id="187" name="Google Shape;187;p21"/>
+          <p:cNvSpPr txBox="1"/>
+          <p:nvPr/>
+        </p:nvSpPr>
+        <p:spPr>
+          <a:xfrm>
+            <a:off x="6504725" y="2250750"/>
+            <a:ext cx="1402800" cy="321000"/>
+          </a:xfrm>
+          <a:prstGeom prst="rect">
+            <a:avLst/>
+          </a:prstGeom>
+          <a:noFill/>
+          <a:ln>
+            <a:noFill/>
+          </a:ln>
+        </p:spPr>
+        <p:txBody>
+          <a:bodyPr anchorCtr="0" anchor="t" bIns="91425" lIns="91425" spcFirstLastPara="1" rIns="91425" wrap="square" tIns="91425">
+            <a:noAutofit/>
+          </a:bodyPr>
+          <a:lstStyle/>
+          <a:p>
+            <a:pPr indent="0" lvl="0" marL="0" rtl="0" algn="l">
+              <a:spcBef>
+                <a:spcPts val="0"/>
+              </a:spcBef>
+              <a:spcAft>
+                <a:spcPts val="0"/>
+              </a:spcAft>
+              <a:buNone/>
+            </a:pPr>
+            <a:r>
+              <a:rPr i="1" lang="en" sz="1200">
+                <a:latin typeface="Calibri"/>
+                <a:ea typeface="Calibri"/>
+                <a:cs typeface="Calibri"/>
+                <a:sym typeface="Calibri"/>
+              </a:rPr>
+              <a:t>1 hidden layer</a:t>
+            </a:r>
+            <a:endParaRPr i="1" sz="1200">
+              <a:latin typeface="Calibri"/>
+              <a:ea typeface="Calibri"/>
+              <a:cs typeface="Calibri"/>
+              <a:sym typeface="Calibri"/>
+            </a:endParaRPr>
+          </a:p>
+        </p:txBody>
+      </p:sp>
+      <p:sp>
+        <p:nvSpPr>
+          <p:cNvPr id="188" name="Google Shape;188;p21"/>
+          <p:cNvSpPr txBox="1"/>
+          <p:nvPr/>
+        </p:nvSpPr>
+        <p:spPr>
+          <a:xfrm>
+            <a:off x="6504725" y="4335875"/>
+            <a:ext cx="1402800" cy="321000"/>
+          </a:xfrm>
+          <a:prstGeom prst="rect">
+            <a:avLst/>
+          </a:prstGeom>
+          <a:noFill/>
+          <a:ln>
+            <a:noFill/>
+          </a:ln>
+        </p:spPr>
+        <p:txBody>
+          <a:bodyPr anchorCtr="0" anchor="t" bIns="91425" lIns="91425" spcFirstLastPara="1" rIns="91425" wrap="square" tIns="91425">
+            <a:noAutofit/>
+          </a:bodyPr>
+          <a:lstStyle/>
+          <a:p>
+            <a:pPr indent="0" lvl="0" marL="0" rtl="0" algn="l">
+              <a:spcBef>
+                <a:spcPts val="0"/>
+              </a:spcBef>
+              <a:spcAft>
+                <a:spcPts val="0"/>
+              </a:spcAft>
+              <a:buNone/>
+            </a:pPr>
+            <a:r>
+              <a:rPr i="1" lang="en" sz="1200">
+                <a:latin typeface="Calibri"/>
+                <a:ea typeface="Calibri"/>
+                <a:cs typeface="Calibri"/>
+                <a:sym typeface="Calibri"/>
+              </a:rPr>
+              <a:t>2 </a:t>
+            </a:r>
+            <a:r>
+              <a:rPr i="1" lang="en" sz="1200">
+                <a:latin typeface="Calibri"/>
+                <a:ea typeface="Calibri"/>
+                <a:cs typeface="Calibri"/>
+                <a:sym typeface="Calibri"/>
+              </a:rPr>
+              <a:t>hidden layers</a:t>
+            </a:r>
+            <a:endParaRPr i="1" sz="1200">
+              <a:latin typeface="Calibri"/>
+              <a:ea typeface="Calibri"/>
+              <a:cs typeface="Calibri"/>
+              <a:sym typeface="Calibri"/>
+            </a:endParaRPr>
+          </a:p>
+        </p:txBody>
+      </p:sp>
     </p:spTree>
   </p:cSld>
   <p:clrMapOvr>

</xml_diff>